<commit_message>
fix(HelpDesk): correção de falhas.
</commit_message>
<xml_diff>
--- a/src/modulo-02-SQLServer/HelpDesk/Trabalho CWI HelpDesk.pptx
+++ b/src/modulo-02-SQLServer/HelpDesk/Trabalho CWI HelpDesk.pptx
@@ -6302,15 +6302,7 @@
                   <a:srgbClr val="FFC000"/>
                 </a:solidFill>
               </a:rPr>
-              <a:t>acesso à internet</a:t>
-            </a:r>
-            <a:r>
-              <a:rPr lang="pt-BR" sz="2400" b="1" dirty="0" smtClean="0"/>
-              <a:t> </a:t>
-            </a:r>
-            <a:r>
-              <a:rPr lang="pt-BR" sz="2400" dirty="0" smtClean="0"/>
-              <a:t>e </a:t>
+              <a:t>acesso à </a:t>
             </a:r>
             <a:r>
               <a:rPr lang="pt-BR" sz="2400" b="1" dirty="0" smtClean="0">
@@ -6318,19 +6310,35 @@
                   <a:srgbClr val="FFC000"/>
                 </a:solidFill>
               </a:rPr>
-              <a:t>aplicação de vendas</a:t>
-            </a:r>
-            <a:r>
-              <a:rPr lang="pt-BR" sz="2400" dirty="0" smtClean="0">
+              <a:t>rede</a:t>
+            </a:r>
+            <a:r>
+              <a:rPr lang="pt-BR" sz="2400" b="1" dirty="0" smtClean="0"/>
+              <a:t> </a:t>
+            </a:r>
+            <a:r>
+              <a:rPr lang="pt-BR" sz="2400" dirty="0" smtClean="0"/>
+              <a:t>e</a:t>
+            </a:r>
+            <a:r>
+              <a:rPr lang="pt-BR" sz="2400" b="1" dirty="0" smtClean="0">
                 <a:solidFill>
                   <a:srgbClr val="FFC000"/>
                 </a:solidFill>
               </a:rPr>
+              <a:t> aplicações</a:t>
+            </a:r>
+            <a:r>
+              <a:rPr lang="pt-BR" sz="2400" b="1" dirty="0"/>
               <a:t> </a:t>
             </a:r>
             <a:r>
               <a:rPr lang="pt-BR" sz="2400" dirty="0" smtClean="0"/>
-              <a:t>dentro da empresa. Com ele é possível criar chamados solicitando o suporte e acompanha-lo tendo acesso ao status atual e previsão de correção do problema. O serviço permite também que gerentes e administradores tenham total controle dos chamados e do desempenho dos técnicos.</a:t>
+              <a:t>dentro da </a:t>
+            </a:r>
+            <a:r>
+              <a:rPr lang="pt-BR" sz="2400" dirty="0" smtClean="0"/>
+              <a:t>empresa. Com ele é possível criar chamados solicitando o suporte e acompanha-lo tendo acesso ao status atual e previsão de correção do problema. O serviço permite também que gerentes e administradores tenham total controle dos chamados e do desempenho dos técnicos.</a:t>
             </a:r>
             <a:endParaRPr lang="pt-BR" sz="2400" dirty="0"/>
           </a:p>
@@ -6467,17 +6475,40 @@
             </a:r>
             <a:r>
               <a:rPr lang="pt-BR" sz="2400" dirty="0"/>
-              <a:t>de hardware, acesso à internet e aplicação de </a:t>
+              <a:t>de hardware, acesso à </a:t>
             </a:r>
             <a:r>
               <a:rPr lang="pt-BR" sz="2400" dirty="0" smtClean="0"/>
-              <a:t>vendas.</a:t>
-            </a:r>
-          </a:p>
-          <a:p>
+              <a:t>rede </a:t>
+            </a:r>
+            <a:r>
+              <a:rPr lang="pt-BR" sz="2400" dirty="0"/>
+              <a:t>e </a:t>
+            </a:r>
             <a:r>
               <a:rPr lang="pt-BR" sz="2400" dirty="0" smtClean="0"/>
-              <a:t>Suporte não relacionado à emprese, seja de funcionário ou não funcionário.</a:t>
+              <a:t>aplicações.</a:t>
+            </a:r>
+          </a:p>
+          <a:p>
+            <a:r>
+              <a:rPr lang="pt-BR" sz="2400" dirty="0" smtClean="0"/>
+              <a:t>Chat com operador em tempo real.</a:t>
+            </a:r>
+            <a:endParaRPr lang="pt-BR" sz="2400" dirty="0" smtClean="0"/>
+          </a:p>
+          <a:p>
+            <a:r>
+              <a:rPr lang="pt-BR" sz="2400" dirty="0" smtClean="0"/>
+              <a:t>Suporte não relacionado à </a:t>
+            </a:r>
+            <a:r>
+              <a:rPr lang="pt-BR" sz="2400" dirty="0" smtClean="0"/>
+              <a:t>empresa, </a:t>
+            </a:r>
+            <a:r>
+              <a:rPr lang="pt-BR" sz="2400" dirty="0" smtClean="0"/>
+              <a:t>seja de funcionário ou não funcionário.</a:t>
             </a:r>
           </a:p>
         </p:txBody>
@@ -6529,12 +6560,7 @@
             <p:ph type="title"/>
           </p:nvPr>
         </p:nvSpPr>
-        <p:spPr>
-          <a:xfrm>
-            <a:off x="646111" y="426960"/>
-            <a:ext cx="9404723" cy="1400530"/>
-          </a:xfrm>
-        </p:spPr>
+        <p:spPr/>
         <p:txBody>
           <a:bodyPr/>
           <a:lstStyle/>
@@ -6560,7 +6586,7 @@
         <p:spPr>
           <a:xfrm>
             <a:off x="1103312" y="2052918"/>
-            <a:ext cx="8947522" cy="4195481"/>
+            <a:ext cx="8594480" cy="4195481"/>
           </a:xfrm>
         </p:spPr>
         <p:txBody>
@@ -6570,20 +6596,32 @@
           <a:lstStyle/>
           <a:p>
             <a:r>
+              <a:rPr lang="pt-BR" sz="2400" b="1" dirty="0" smtClean="0">
+                <a:solidFill>
+                  <a:srgbClr val="FFC000"/>
+                </a:solidFill>
+              </a:rPr>
+              <a:t>Solicitação de </a:t>
+            </a:r>
+            <a:r>
+              <a:rPr lang="pt-BR" sz="2400" b="1" dirty="0" smtClean="0">
+                <a:solidFill>
+                  <a:srgbClr val="FFC000"/>
+                </a:solidFill>
+              </a:rPr>
+              <a:t>chamado (usuário final): </a:t>
+            </a:r>
+            <a:r>
+              <a:rPr lang="pt-BR" sz="2400" dirty="0"/>
+              <a:t>U</a:t>
+            </a:r>
+            <a:r>
               <a:rPr lang="pt-BR" sz="2400" dirty="0" smtClean="0"/>
-              <a:t>Solicitação de chamado de usuário final:</a:t>
-            </a:r>
-            <a:r>
-              <a:rPr lang="pt-BR" sz="2400" dirty="0"/>
-              <a:t> </a:t>
+              <a:t>suário </a:t>
             </a:r>
             <a:r>
               <a:rPr lang="pt-BR" sz="2400" dirty="0" smtClean="0"/>
-              <a:t>usuário </a:t>
-            </a:r>
-            <a:r>
-              <a:rPr lang="pt-BR" sz="2400" dirty="0" smtClean="0"/>
-              <a:t>faz cadastro, sistema valida seu e-mail(verifica se é da empresa), usuário faz </a:t>
+              <a:t>faz </a:t>
             </a:r>
             <a:r>
               <a:rPr lang="pt-BR" sz="2400" dirty="0" err="1" smtClean="0"/>
@@ -6591,11 +6629,27 @@
             </a:r>
             <a:r>
               <a:rPr lang="pt-BR" sz="2400" dirty="0" smtClean="0"/>
-              <a:t> no sistema, faz a solicitação de chamada informando os dados necessários, em seguida ele pode acompanhar a situação de seu chamado e também a  data de previsão do solução do problema informado</a:t>
+              <a:t> no sistema, faz a solicitação de chamada informando os dados necessários, em seguida ele pode acompanhar a situação de seu chamado e também a  data de previsão </a:t>
+            </a:r>
+            <a:r>
+              <a:rPr lang="pt-BR" sz="2400" dirty="0" smtClean="0"/>
+              <a:t>da </a:t>
+            </a:r>
+            <a:r>
+              <a:rPr lang="pt-BR" sz="2400" dirty="0" smtClean="0"/>
+              <a:t>solução do problema informado</a:t>
             </a:r>
             <a:r>
               <a:rPr lang="pt-BR" sz="2400" dirty="0"/>
-              <a:t>. Após um chamado ser encerrado o usuário pode classificar o nível de qualidade do serviço.</a:t>
+              <a:t>. Após o</a:t>
+            </a:r>
+            <a:r>
+              <a:rPr lang="pt-BR" sz="2400" dirty="0" smtClean="0"/>
+              <a:t> </a:t>
+            </a:r>
+            <a:r>
+              <a:rPr lang="pt-BR" sz="2400" dirty="0"/>
+              <a:t>chamado ser encerrado o usuário pode classificar o nível de qualidade do serviço.</a:t>
             </a:r>
           </a:p>
           <a:p>
@@ -6603,6 +6657,47 @@
           </a:p>
         </p:txBody>
       </p:sp>
+      <p:pic>
+        <p:nvPicPr>
+          <p:cNvPr id="1026" name="Picture 2" descr="male-user-icon-32207.png (256×256)"/>
+          <p:cNvPicPr>
+            <a:picLocks noChangeAspect="1" noChangeArrowheads="1"/>
+          </p:cNvPicPr>
+          <p:nvPr/>
+        </p:nvPicPr>
+        <p:blipFill>
+          <a:blip r:embed="rId2">
+            <a:extLst>
+              <a:ext uri="{28A0092B-C50C-407E-A947-70E740481C1C}">
+                <a14:useLocalDpi xmlns:a14="http://schemas.microsoft.com/office/drawing/2010/main" val="0"/>
+              </a:ext>
+            </a:extLst>
+          </a:blip>
+          <a:srcRect/>
+          <a:stretch>
+            <a:fillRect/>
+          </a:stretch>
+        </p:blipFill>
+        <p:spPr bwMode="auto">
+          <a:xfrm>
+            <a:off x="9170786" y="3719847"/>
+            <a:ext cx="2438400" cy="2438400"/>
+          </a:xfrm>
+          <a:prstGeom prst="rect">
+            <a:avLst/>
+          </a:prstGeom>
+          <a:noFill/>
+          <a:extLst>
+            <a:ext uri="{909E8E84-426E-40DD-AFC4-6F175D3DCCD1}">
+              <a14:hiddenFill xmlns:a14="http://schemas.microsoft.com/office/drawing/2010/main">
+                <a:solidFill>
+                  <a:srgbClr val="FFFFFF"/>
+                </a:solidFill>
+              </a14:hiddenFill>
+            </a:ext>
+          </a:extLst>
+        </p:spPr>
+      </p:pic>
     </p:spTree>
     <p:extLst>
       <p:ext uri="{BB962C8B-B14F-4D97-AF65-F5344CB8AC3E}">
@@ -6673,7 +6768,12 @@
             <p:ph idx="1"/>
           </p:nvPr>
         </p:nvSpPr>
-        <p:spPr/>
+        <p:spPr>
+          <a:xfrm>
+            <a:off x="950911" y="2034488"/>
+            <a:ext cx="8946541" cy="4195481"/>
+          </a:xfrm>
+        </p:spPr>
         <p:txBody>
           <a:bodyPr>
             <a:normAutofit/>
@@ -6681,8 +6781,28 @@
           <a:lstStyle/>
           <a:p>
             <a:r>
+              <a:rPr lang="pt-BR" sz="2400" b="1" dirty="0" smtClean="0">
+                <a:solidFill>
+                  <a:srgbClr val="FFC000"/>
+                </a:solidFill>
+              </a:rPr>
+              <a:t>Operador recebe chamado</a:t>
+            </a:r>
+            <a:r>
+              <a:rPr lang="pt-BR" sz="2400" dirty="0" smtClean="0">
+                <a:solidFill>
+                  <a:srgbClr val="FFC000"/>
+                </a:solidFill>
+              </a:rPr>
+              <a:t>: </a:t>
+            </a:r>
+            <a:r>
               <a:rPr lang="pt-BR" sz="2400" dirty="0" smtClean="0"/>
-              <a:t>Após um usuário fazer um chamado, o operador do </a:t>
+              <a:t>Após </a:t>
+            </a:r>
+            <a:r>
+              <a:rPr lang="pt-BR" sz="2400" dirty="0" smtClean="0"/>
+              <a:t>um usuário fazer um chamado, o operador do </a:t>
             </a:r>
             <a:r>
               <a:rPr lang="pt-BR" sz="2400" dirty="0" err="1" smtClean="0"/>
@@ -6698,12 +6818,120 @@
             </a:r>
             <a:r>
               <a:rPr lang="pt-BR" sz="2400" dirty="0" smtClean="0"/>
-              <a:t> recebe uma notificação a partir do painel de solicitações de chamado. Neste ambiente o operador tem capacidade de definir a data de previsão de correção de chamado, após corrigir o problema é possível também manter o usuário ciente da situação atual de sua solicitação. </a:t>
+              <a:t> recebe uma notificação a partir do painel de solicitações de chamado. Neste ambiente o operador tem capacidade de definir a data da previsão de correção do chamado, após isso é possível também manter o usuário ciente da situação atual de sua solicitação.</a:t>
             </a:r>
             <a:endParaRPr lang="pt-BR" sz="2400" dirty="0"/>
           </a:p>
         </p:txBody>
       </p:sp>
+      <p:sp>
+        <p:nvSpPr>
+          <p:cNvPr id="4" name="AutoShape 2" descr="icons-land-vista-people-occupations-technical-support-representative-male-light.ico (256×256)"/>
+          <p:cNvSpPr>
+            <a:spLocks noChangeAspect="1" noChangeArrowheads="1"/>
+          </p:cNvSpPr>
+          <p:nvPr/>
+        </p:nvSpPr>
+        <p:spPr bwMode="auto">
+          <a:xfrm>
+            <a:off x="155575" y="-144463"/>
+            <a:ext cx="1711862" cy="1711868"/>
+          </a:xfrm>
+          <a:prstGeom prst="rect">
+            <a:avLst/>
+          </a:prstGeom>
+          <a:noFill/>
+          <a:extLst>
+            <a:ext uri="{909E8E84-426E-40DD-AFC4-6F175D3DCCD1}">
+              <a14:hiddenFill xmlns:a14="http://schemas.microsoft.com/office/drawing/2010/main">
+                <a:solidFill>
+                  <a:srgbClr val="FFFFFF"/>
+                </a:solidFill>
+              </a14:hiddenFill>
+            </a:ext>
+          </a:extLst>
+        </p:spPr>
+        <p:txBody>
+          <a:bodyPr vert="horz" wrap="square" lIns="91440" tIns="45720" rIns="91440" bIns="45720" numCol="1" anchor="t" anchorCtr="0" compatLnSpc="1">
+            <a:prstTxWarp prst="textNoShape">
+              <a:avLst/>
+            </a:prstTxWarp>
+          </a:bodyPr>
+          <a:lstStyle/>
+          <a:p>
+            <a:endParaRPr lang="pt-BR"/>
+          </a:p>
+        </p:txBody>
+      </p:sp>
+      <p:sp>
+        <p:nvSpPr>
+          <p:cNvPr id="5" name="AutoShape 4" descr="icons-land-vista-people-occupations-technical-support-representative-male-light.ico (256×256)"/>
+          <p:cNvSpPr>
+            <a:spLocks noChangeAspect="1" noChangeArrowheads="1"/>
+          </p:cNvSpPr>
+          <p:nvPr/>
+        </p:nvSpPr>
+        <p:spPr bwMode="auto">
+          <a:xfrm>
+            <a:off x="646111" y="406670"/>
+            <a:ext cx="304800" cy="304801"/>
+          </a:xfrm>
+          <a:prstGeom prst="rect">
+            <a:avLst/>
+          </a:prstGeom>
+          <a:noFill/>
+          <a:extLst>
+            <a:ext uri="{909E8E84-426E-40DD-AFC4-6F175D3DCCD1}">
+              <a14:hiddenFill xmlns:a14="http://schemas.microsoft.com/office/drawing/2010/main">
+                <a:solidFill>
+                  <a:srgbClr val="FFFFFF"/>
+                </a:solidFill>
+              </a14:hiddenFill>
+            </a:ext>
+          </a:extLst>
+        </p:spPr>
+        <p:txBody>
+          <a:bodyPr vert="horz" wrap="square" lIns="91440" tIns="45720" rIns="91440" bIns="45720" numCol="1" anchor="t" anchorCtr="0" compatLnSpc="1">
+            <a:prstTxWarp prst="textNoShape">
+              <a:avLst/>
+            </a:prstTxWarp>
+          </a:bodyPr>
+          <a:lstStyle/>
+          <a:p>
+            <a:endParaRPr lang="pt-BR"/>
+          </a:p>
+        </p:txBody>
+      </p:sp>
+      <p:pic>
+        <p:nvPicPr>
+          <p:cNvPr id="7" name="Imagem 6"/>
+          <p:cNvPicPr>
+            <a:picLocks noChangeAspect="1"/>
+          </p:cNvPicPr>
+          <p:nvPr/>
+        </p:nvPicPr>
+        <p:blipFill>
+          <a:blip r:embed="rId2">
+            <a:extLst>
+              <a:ext uri="{28A0092B-C50C-407E-A947-70E740481C1C}">
+                <a14:useLocalDpi xmlns:a14="http://schemas.microsoft.com/office/drawing/2010/main" val="0"/>
+              </a:ext>
+            </a:extLst>
+          </a:blip>
+          <a:stretch>
+            <a:fillRect/>
+          </a:stretch>
+        </p:blipFill>
+        <p:spPr>
+          <a:xfrm>
+            <a:off x="9294253" y="3809999"/>
+            <a:ext cx="2438400" cy="2438400"/>
+          </a:xfrm>
+          <a:prstGeom prst="rect">
+            <a:avLst/>
+          </a:prstGeom>
+        </p:spPr>
+      </p:pic>
     </p:spTree>
     <p:extLst>
       <p:ext uri="{BB962C8B-B14F-4D97-AF65-F5344CB8AC3E}">
@@ -6743,13 +6971,13 @@
       </p:grpSpPr>
       <p:sp>
         <p:nvSpPr>
-          <p:cNvPr id="6" name="Retângulo 5"/>
+          <p:cNvPr id="7" name="Retângulo 6"/>
           <p:cNvSpPr/>
           <p:nvPr/>
         </p:nvSpPr>
         <p:spPr>
           <a:xfrm>
-            <a:off x="0" y="0"/>
+            <a:off x="0" y="1"/>
             <a:ext cx="12192000" cy="6858000"/>
           </a:xfrm>
           <a:prstGeom prst="rect">
@@ -6766,16 +6994,18 @@
         </p:spPr>
         <p:style>
           <a:lnRef idx="2">
-            <a:schemeClr val="accent6"/>
+            <a:schemeClr val="accent1">
+              <a:shade val="50000"/>
+            </a:schemeClr>
           </a:lnRef>
           <a:fillRef idx="1">
-            <a:schemeClr val="lt1"/>
+            <a:schemeClr val="accent1"/>
           </a:fillRef>
           <a:effectRef idx="0">
-            <a:schemeClr val="accent6"/>
+            <a:schemeClr val="accent1"/>
           </a:effectRef>
           <a:fontRef idx="minor">
-            <a:schemeClr val="dk1"/>
+            <a:schemeClr val="lt1"/>
           </a:fontRef>
         </p:style>
         <p:txBody>
@@ -6783,13 +7013,17 @@
           <a:lstStyle/>
           <a:p>
             <a:pPr algn="ctr"/>
-            <a:endParaRPr lang="pt-BR"/>
+            <a:endParaRPr lang="pt-BR">
+              <a:solidFill>
+                <a:schemeClr val="accent1"/>
+              </a:solidFill>
+            </a:endParaRPr>
           </a:p>
         </p:txBody>
       </p:sp>
       <p:pic>
         <p:nvPicPr>
-          <p:cNvPr id="4" name="Espaço Reservado para Conteúdo 3"/>
+          <p:cNvPr id="6" name="Espaço Reservado para Conteúdo 5"/>
           <p:cNvPicPr>
             <a:picLocks noGrp="1" noChangeAspect="1"/>
           </p:cNvPicPr>
@@ -6811,8 +7045,8 @@
         </p:blipFill>
         <p:spPr>
           <a:xfrm>
-            <a:off x="3447653" y="167525"/>
-            <a:ext cx="8400910" cy="6690475"/>
+            <a:off x="3236335" y="107741"/>
+            <a:ext cx="8475979" cy="6750260"/>
           </a:xfrm>
         </p:spPr>
       </p:pic>
@@ -6828,8 +7062,8 @@
         </p:nvSpPr>
         <p:spPr>
           <a:xfrm>
-            <a:off x="456323" y="342594"/>
-            <a:ext cx="2991330" cy="925321"/>
+            <a:off x="362776" y="323929"/>
+            <a:ext cx="9404723" cy="1400530"/>
           </a:xfrm>
         </p:spPr>
         <p:txBody>
@@ -6975,8 +7209,21 @@
             </a:r>
             <a:r>
               <a:rPr lang="pt-BR" sz="2400" dirty="0" smtClean="0"/>
-              <a:t>, Solicitação de chamado, Consulta de solicitação de chamado, Painel de Gerência, Painel Administrativo, Menu de navegação.</a:t>
-            </a:r>
+              <a:t>, Solicitação de chamado, Consulta de solicitação de chamado, Painel de Gerência, Painel Administrativo, Menu de </a:t>
+            </a:r>
+            <a:r>
+              <a:rPr lang="pt-BR" sz="2400" dirty="0" smtClean="0"/>
+              <a:t>navegação(home </a:t>
+            </a:r>
+            <a:r>
+              <a:rPr lang="pt-BR" sz="2400" dirty="0" err="1" smtClean="0"/>
+              <a:t>page</a:t>
+            </a:r>
+            <a:r>
+              <a:rPr lang="pt-BR" sz="2400" dirty="0" smtClean="0"/>
+              <a:t>).</a:t>
+            </a:r>
+            <a:endParaRPr lang="pt-BR" sz="2400" dirty="0" smtClean="0"/>
           </a:p>
           <a:p>
             <a:r>
@@ -6985,7 +7232,15 @@
             </a:r>
             <a:r>
               <a:rPr lang="pt-BR" sz="2800" b="1" u="sng" dirty="0" smtClean="0"/>
-              <a:t>63 Horas</a:t>
+              <a:t>51</a:t>
+            </a:r>
+            <a:r>
+              <a:rPr lang="pt-BR" sz="2800" b="1" u="sng" dirty="0" smtClean="0"/>
+              <a:t> </a:t>
+            </a:r>
+            <a:r>
+              <a:rPr lang="pt-BR" sz="2800" b="1" u="sng" dirty="0" smtClean="0"/>
+              <a:t>Horas</a:t>
             </a:r>
           </a:p>
           <a:p>
@@ -7001,8 +7256,16 @@
               <a:t>Análise e modelagem: </a:t>
             </a:r>
             <a:r>
+              <a:rPr lang="pt-BR" b="1" dirty="0"/>
+              <a:t>6</a:t>
+            </a:r>
+            <a:r>
               <a:rPr lang="pt-BR" b="1" dirty="0" smtClean="0"/>
-              <a:t>8 Horas</a:t>
+              <a:t> </a:t>
+            </a:r>
+            <a:r>
+              <a:rPr lang="pt-BR" b="1" dirty="0" smtClean="0"/>
+              <a:t>Horas</a:t>
             </a:r>
           </a:p>
           <a:p>
@@ -7015,7 +7278,15 @@
             </a:r>
             <a:r>
               <a:rPr lang="pt-BR" b="1" dirty="0" smtClean="0"/>
-              <a:t>30 horas</a:t>
+              <a:t>25</a:t>
+            </a:r>
+            <a:r>
+              <a:rPr lang="pt-BR" b="1" dirty="0" smtClean="0"/>
+              <a:t> </a:t>
+            </a:r>
+            <a:r>
+              <a:rPr lang="pt-BR" b="1" dirty="0" smtClean="0"/>
+              <a:t>horas</a:t>
             </a:r>
           </a:p>
           <a:p>
@@ -7028,7 +7299,11 @@
             </a:r>
             <a:r>
               <a:rPr lang="pt-BR" b="1" dirty="0" smtClean="0"/>
-              <a:t>15 horas</a:t>
+              <a:t>10 </a:t>
+            </a:r>
+            <a:r>
+              <a:rPr lang="pt-BR" b="1" dirty="0" smtClean="0"/>
+              <a:t>horas</a:t>
             </a:r>
           </a:p>
           <a:p>

</xml_diff>